<commit_message>
update and replace drive to here
</commit_message>
<xml_diff>
--- a/Sem-1/RDBMS (Relational Database Management System)/Provided/Practicals Syntax and Example.pptx
+++ b/Sem-1/RDBMS (Relational Database Management System)/Provided/Practicals Syntax and Example.pptx
@@ -125,6 +125,11 @@
       </a:defRPr>
     </a:lvl9pPr>
   </p:defaultTextStyle>
+  <p:extLst>
+    <p:ext uri="{EFAFB233-063F-42B5-8137-9DF3F51BA10A}">
+      <p15:sldGuideLst xmlns:p15="http://schemas.microsoft.com/office/powerpoint/2012/main"/>
+    </p:ext>
+  </p:extLst>
 </p:presentation>
 </file>
 
@@ -150,7 +155,7 @@
           <p:cNvPr id="2" name="Title 1">
             <a:extLst>
               <a:ext uri="{FF2B5EF4-FFF2-40B4-BE49-F238E27FC236}">
-                <a16:creationId xmlns:a16="http://schemas.microsoft.com/office/drawing/2014/main" id="{FB4B2A22-119D-79C3-276C-F044B775747D}"/>
+                <a16:creationId xmlns:a16="http://schemas.microsoft.com/office/drawing/2014/main" xmlns="" id="{FB4B2A22-119D-79C3-276C-F044B775747D}"/>
               </a:ext>
             </a:extLst>
           </p:cNvPr>
@@ -187,7 +192,7 @@
           <p:cNvPr id="3" name="Subtitle 2">
             <a:extLst>
               <a:ext uri="{FF2B5EF4-FFF2-40B4-BE49-F238E27FC236}">
-                <a16:creationId xmlns:a16="http://schemas.microsoft.com/office/drawing/2014/main" id="{CE5F2355-A941-C0F4-AE07-425515210786}"/>
+                <a16:creationId xmlns:a16="http://schemas.microsoft.com/office/drawing/2014/main" xmlns="" id="{CE5F2355-A941-C0F4-AE07-425515210786}"/>
               </a:ext>
             </a:extLst>
           </p:cNvPr>
@@ -257,7 +262,7 @@
           <p:cNvPr id="4" name="Date Placeholder 3">
             <a:extLst>
               <a:ext uri="{FF2B5EF4-FFF2-40B4-BE49-F238E27FC236}">
-                <a16:creationId xmlns:a16="http://schemas.microsoft.com/office/drawing/2014/main" id="{4876AB73-065B-3D40-F606-F55452565892}"/>
+                <a16:creationId xmlns:a16="http://schemas.microsoft.com/office/drawing/2014/main" xmlns="" id="{4876AB73-065B-3D40-F606-F55452565892}"/>
               </a:ext>
             </a:extLst>
           </p:cNvPr>
@@ -275,7 +280,7 @@
           <a:p>
             <a:fld id="{4023423A-A389-4461-8CC8-2DB9B479FB65}" type="datetimeFigureOut">
               <a:rPr lang="en-US" smtClean="0"/>
-              <a:t>9/3/2023</a:t>
+              <a:t>9/10/2025</a:t>
             </a:fld>
             <a:endParaRPr lang="en-US"/>
           </a:p>
@@ -286,7 +291,7 @@
           <p:cNvPr id="5" name="Footer Placeholder 4">
             <a:extLst>
               <a:ext uri="{FF2B5EF4-FFF2-40B4-BE49-F238E27FC236}">
-                <a16:creationId xmlns:a16="http://schemas.microsoft.com/office/drawing/2014/main" id="{1CD12B86-5726-71B4-213A-FAD87F00BF19}"/>
+                <a16:creationId xmlns:a16="http://schemas.microsoft.com/office/drawing/2014/main" xmlns="" id="{1CD12B86-5726-71B4-213A-FAD87F00BF19}"/>
               </a:ext>
             </a:extLst>
           </p:cNvPr>
@@ -311,7 +316,7 @@
           <p:cNvPr id="6" name="Slide Number Placeholder 5">
             <a:extLst>
               <a:ext uri="{FF2B5EF4-FFF2-40B4-BE49-F238E27FC236}">
-                <a16:creationId xmlns:a16="http://schemas.microsoft.com/office/drawing/2014/main" id="{9BB4C22A-9450-1226-7B18-426D5C988CC4}"/>
+                <a16:creationId xmlns:a16="http://schemas.microsoft.com/office/drawing/2014/main" xmlns="" id="{9BB4C22A-9450-1226-7B18-426D5C988CC4}"/>
               </a:ext>
             </a:extLst>
           </p:cNvPr>
@@ -370,7 +375,7 @@
           <p:cNvPr id="2" name="Title 1">
             <a:extLst>
               <a:ext uri="{FF2B5EF4-FFF2-40B4-BE49-F238E27FC236}">
-                <a16:creationId xmlns:a16="http://schemas.microsoft.com/office/drawing/2014/main" id="{81DFEA77-5216-759A-A0EE-AEA1D8407C61}"/>
+                <a16:creationId xmlns:a16="http://schemas.microsoft.com/office/drawing/2014/main" xmlns="" id="{81DFEA77-5216-759A-A0EE-AEA1D8407C61}"/>
               </a:ext>
             </a:extLst>
           </p:cNvPr>
@@ -398,7 +403,7 @@
           <p:cNvPr id="3" name="Vertical Text Placeholder 2">
             <a:extLst>
               <a:ext uri="{FF2B5EF4-FFF2-40B4-BE49-F238E27FC236}">
-                <a16:creationId xmlns:a16="http://schemas.microsoft.com/office/drawing/2014/main" id="{CD604DA2-A8DC-1042-3616-EE6513BB3BE6}"/>
+                <a16:creationId xmlns:a16="http://schemas.microsoft.com/office/drawing/2014/main" xmlns="" id="{CD604DA2-A8DC-1042-3616-EE6513BB3BE6}"/>
               </a:ext>
             </a:extLst>
           </p:cNvPr>
@@ -455,7 +460,7 @@
           <p:cNvPr id="4" name="Date Placeholder 3">
             <a:extLst>
               <a:ext uri="{FF2B5EF4-FFF2-40B4-BE49-F238E27FC236}">
-                <a16:creationId xmlns:a16="http://schemas.microsoft.com/office/drawing/2014/main" id="{116622B3-DCE5-5940-6BE1-18CDFDF1AC9B}"/>
+                <a16:creationId xmlns:a16="http://schemas.microsoft.com/office/drawing/2014/main" xmlns="" id="{116622B3-DCE5-5940-6BE1-18CDFDF1AC9B}"/>
               </a:ext>
             </a:extLst>
           </p:cNvPr>
@@ -473,7 +478,7 @@
           <a:p>
             <a:fld id="{4023423A-A389-4461-8CC8-2DB9B479FB65}" type="datetimeFigureOut">
               <a:rPr lang="en-US" smtClean="0"/>
-              <a:t>9/3/2023</a:t>
+              <a:t>9/10/2025</a:t>
             </a:fld>
             <a:endParaRPr lang="en-US"/>
           </a:p>
@@ -484,7 +489,7 @@
           <p:cNvPr id="5" name="Footer Placeholder 4">
             <a:extLst>
               <a:ext uri="{FF2B5EF4-FFF2-40B4-BE49-F238E27FC236}">
-                <a16:creationId xmlns:a16="http://schemas.microsoft.com/office/drawing/2014/main" id="{A0840FA8-DE98-B685-7B9B-81958A82BC44}"/>
+                <a16:creationId xmlns:a16="http://schemas.microsoft.com/office/drawing/2014/main" xmlns="" id="{A0840FA8-DE98-B685-7B9B-81958A82BC44}"/>
               </a:ext>
             </a:extLst>
           </p:cNvPr>
@@ -509,7 +514,7 @@
           <p:cNvPr id="6" name="Slide Number Placeholder 5">
             <a:extLst>
               <a:ext uri="{FF2B5EF4-FFF2-40B4-BE49-F238E27FC236}">
-                <a16:creationId xmlns:a16="http://schemas.microsoft.com/office/drawing/2014/main" id="{87821044-239F-10E3-4AE0-FFA2E8283F25}"/>
+                <a16:creationId xmlns:a16="http://schemas.microsoft.com/office/drawing/2014/main" xmlns="" id="{87821044-239F-10E3-4AE0-FFA2E8283F25}"/>
               </a:ext>
             </a:extLst>
           </p:cNvPr>
@@ -568,7 +573,7 @@
           <p:cNvPr id="2" name="Vertical Title 1">
             <a:extLst>
               <a:ext uri="{FF2B5EF4-FFF2-40B4-BE49-F238E27FC236}">
-                <a16:creationId xmlns:a16="http://schemas.microsoft.com/office/drawing/2014/main" id="{F3485733-7F9A-1F79-221B-5893CB123BA0}"/>
+                <a16:creationId xmlns:a16="http://schemas.microsoft.com/office/drawing/2014/main" xmlns="" id="{F3485733-7F9A-1F79-221B-5893CB123BA0}"/>
               </a:ext>
             </a:extLst>
           </p:cNvPr>
@@ -601,7 +606,7 @@
           <p:cNvPr id="3" name="Vertical Text Placeholder 2">
             <a:extLst>
               <a:ext uri="{FF2B5EF4-FFF2-40B4-BE49-F238E27FC236}">
-                <a16:creationId xmlns:a16="http://schemas.microsoft.com/office/drawing/2014/main" id="{3A57AB2F-F716-0C68-4B97-7656CE9510F9}"/>
+                <a16:creationId xmlns:a16="http://schemas.microsoft.com/office/drawing/2014/main" xmlns="" id="{3A57AB2F-F716-0C68-4B97-7656CE9510F9}"/>
               </a:ext>
             </a:extLst>
           </p:cNvPr>
@@ -663,7 +668,7 @@
           <p:cNvPr id="4" name="Date Placeholder 3">
             <a:extLst>
               <a:ext uri="{FF2B5EF4-FFF2-40B4-BE49-F238E27FC236}">
-                <a16:creationId xmlns:a16="http://schemas.microsoft.com/office/drawing/2014/main" id="{A09A3105-05C2-ADF7-FFC8-BD17E802E22D}"/>
+                <a16:creationId xmlns:a16="http://schemas.microsoft.com/office/drawing/2014/main" xmlns="" id="{A09A3105-05C2-ADF7-FFC8-BD17E802E22D}"/>
               </a:ext>
             </a:extLst>
           </p:cNvPr>
@@ -681,7 +686,7 @@
           <a:p>
             <a:fld id="{4023423A-A389-4461-8CC8-2DB9B479FB65}" type="datetimeFigureOut">
               <a:rPr lang="en-US" smtClean="0"/>
-              <a:t>9/3/2023</a:t>
+              <a:t>9/10/2025</a:t>
             </a:fld>
             <a:endParaRPr lang="en-US"/>
           </a:p>
@@ -692,7 +697,7 @@
           <p:cNvPr id="5" name="Footer Placeholder 4">
             <a:extLst>
               <a:ext uri="{FF2B5EF4-FFF2-40B4-BE49-F238E27FC236}">
-                <a16:creationId xmlns:a16="http://schemas.microsoft.com/office/drawing/2014/main" id="{37BB71E7-99AB-9D2C-CD0F-99A7461C2862}"/>
+                <a16:creationId xmlns:a16="http://schemas.microsoft.com/office/drawing/2014/main" xmlns="" id="{37BB71E7-99AB-9D2C-CD0F-99A7461C2862}"/>
               </a:ext>
             </a:extLst>
           </p:cNvPr>
@@ -717,7 +722,7 @@
           <p:cNvPr id="6" name="Slide Number Placeholder 5">
             <a:extLst>
               <a:ext uri="{FF2B5EF4-FFF2-40B4-BE49-F238E27FC236}">
-                <a16:creationId xmlns:a16="http://schemas.microsoft.com/office/drawing/2014/main" id="{B6815837-654E-0729-EED0-6FA0DBD9EA1F}"/>
+                <a16:creationId xmlns:a16="http://schemas.microsoft.com/office/drawing/2014/main" xmlns="" id="{B6815837-654E-0729-EED0-6FA0DBD9EA1F}"/>
               </a:ext>
             </a:extLst>
           </p:cNvPr>
@@ -776,7 +781,7 @@
           <p:cNvPr id="2" name="Title 1">
             <a:extLst>
               <a:ext uri="{FF2B5EF4-FFF2-40B4-BE49-F238E27FC236}">
-                <a16:creationId xmlns:a16="http://schemas.microsoft.com/office/drawing/2014/main" id="{FAD6262D-F199-BD6B-9017-E6673270689F}"/>
+                <a16:creationId xmlns:a16="http://schemas.microsoft.com/office/drawing/2014/main" xmlns="" id="{FAD6262D-F199-BD6B-9017-E6673270689F}"/>
               </a:ext>
             </a:extLst>
           </p:cNvPr>
@@ -804,7 +809,7 @@
           <p:cNvPr id="3" name="Content Placeholder 2">
             <a:extLst>
               <a:ext uri="{FF2B5EF4-FFF2-40B4-BE49-F238E27FC236}">
-                <a16:creationId xmlns:a16="http://schemas.microsoft.com/office/drawing/2014/main" id="{14119E5D-47EF-FC80-0036-6A4C1D2AD0CC}"/>
+                <a16:creationId xmlns:a16="http://schemas.microsoft.com/office/drawing/2014/main" xmlns="" id="{14119E5D-47EF-FC80-0036-6A4C1D2AD0CC}"/>
               </a:ext>
             </a:extLst>
           </p:cNvPr>
@@ -861,7 +866,7 @@
           <p:cNvPr id="4" name="Date Placeholder 3">
             <a:extLst>
               <a:ext uri="{FF2B5EF4-FFF2-40B4-BE49-F238E27FC236}">
-                <a16:creationId xmlns:a16="http://schemas.microsoft.com/office/drawing/2014/main" id="{B95C6FE5-BBA1-A892-8BAB-AD8B4F4F2E72}"/>
+                <a16:creationId xmlns:a16="http://schemas.microsoft.com/office/drawing/2014/main" xmlns="" id="{B95C6FE5-BBA1-A892-8BAB-AD8B4F4F2E72}"/>
               </a:ext>
             </a:extLst>
           </p:cNvPr>
@@ -879,7 +884,7 @@
           <a:p>
             <a:fld id="{4023423A-A389-4461-8CC8-2DB9B479FB65}" type="datetimeFigureOut">
               <a:rPr lang="en-US" smtClean="0"/>
-              <a:t>9/3/2023</a:t>
+              <a:t>9/10/2025</a:t>
             </a:fld>
             <a:endParaRPr lang="en-US"/>
           </a:p>
@@ -890,7 +895,7 @@
           <p:cNvPr id="5" name="Footer Placeholder 4">
             <a:extLst>
               <a:ext uri="{FF2B5EF4-FFF2-40B4-BE49-F238E27FC236}">
-                <a16:creationId xmlns:a16="http://schemas.microsoft.com/office/drawing/2014/main" id="{7ECCBDF6-73B0-D900-E0F2-E05015A07496}"/>
+                <a16:creationId xmlns:a16="http://schemas.microsoft.com/office/drawing/2014/main" xmlns="" id="{7ECCBDF6-73B0-D900-E0F2-E05015A07496}"/>
               </a:ext>
             </a:extLst>
           </p:cNvPr>
@@ -915,7 +920,7 @@
           <p:cNvPr id="6" name="Slide Number Placeholder 5">
             <a:extLst>
               <a:ext uri="{FF2B5EF4-FFF2-40B4-BE49-F238E27FC236}">
-                <a16:creationId xmlns:a16="http://schemas.microsoft.com/office/drawing/2014/main" id="{0839B7E6-7985-5284-F97D-491A517265F7}"/>
+                <a16:creationId xmlns:a16="http://schemas.microsoft.com/office/drawing/2014/main" xmlns="" id="{0839B7E6-7985-5284-F97D-491A517265F7}"/>
               </a:ext>
             </a:extLst>
           </p:cNvPr>
@@ -974,7 +979,7 @@
           <p:cNvPr id="2" name="Title 1">
             <a:extLst>
               <a:ext uri="{FF2B5EF4-FFF2-40B4-BE49-F238E27FC236}">
-                <a16:creationId xmlns:a16="http://schemas.microsoft.com/office/drawing/2014/main" id="{3A3222EF-9E88-247F-B08A-62F51C1066EE}"/>
+                <a16:creationId xmlns:a16="http://schemas.microsoft.com/office/drawing/2014/main" xmlns="" id="{3A3222EF-9E88-247F-B08A-62F51C1066EE}"/>
               </a:ext>
             </a:extLst>
           </p:cNvPr>
@@ -1011,7 +1016,7 @@
           <p:cNvPr id="3" name="Text Placeholder 2">
             <a:extLst>
               <a:ext uri="{FF2B5EF4-FFF2-40B4-BE49-F238E27FC236}">
-                <a16:creationId xmlns:a16="http://schemas.microsoft.com/office/drawing/2014/main" id="{E1BE2614-C184-773B-36B4-B4E83B88D6B7}"/>
+                <a16:creationId xmlns:a16="http://schemas.microsoft.com/office/drawing/2014/main" xmlns="" id="{E1BE2614-C184-773B-36B4-B4E83B88D6B7}"/>
               </a:ext>
             </a:extLst>
           </p:cNvPr>
@@ -1136,7 +1141,7 @@
           <p:cNvPr id="4" name="Date Placeholder 3">
             <a:extLst>
               <a:ext uri="{FF2B5EF4-FFF2-40B4-BE49-F238E27FC236}">
-                <a16:creationId xmlns:a16="http://schemas.microsoft.com/office/drawing/2014/main" id="{82F07A4C-F704-8935-1675-AA0CEF85335F}"/>
+                <a16:creationId xmlns:a16="http://schemas.microsoft.com/office/drawing/2014/main" xmlns="" id="{82F07A4C-F704-8935-1675-AA0CEF85335F}"/>
               </a:ext>
             </a:extLst>
           </p:cNvPr>
@@ -1154,7 +1159,7 @@
           <a:p>
             <a:fld id="{4023423A-A389-4461-8CC8-2DB9B479FB65}" type="datetimeFigureOut">
               <a:rPr lang="en-US" smtClean="0"/>
-              <a:t>9/3/2023</a:t>
+              <a:t>9/10/2025</a:t>
             </a:fld>
             <a:endParaRPr lang="en-US"/>
           </a:p>
@@ -1165,7 +1170,7 @@
           <p:cNvPr id="5" name="Footer Placeholder 4">
             <a:extLst>
               <a:ext uri="{FF2B5EF4-FFF2-40B4-BE49-F238E27FC236}">
-                <a16:creationId xmlns:a16="http://schemas.microsoft.com/office/drawing/2014/main" id="{5485E9E9-7CEC-BDF5-64D7-FA82BD2DCCEF}"/>
+                <a16:creationId xmlns:a16="http://schemas.microsoft.com/office/drawing/2014/main" xmlns="" id="{5485E9E9-7CEC-BDF5-64D7-FA82BD2DCCEF}"/>
               </a:ext>
             </a:extLst>
           </p:cNvPr>
@@ -1190,7 +1195,7 @@
           <p:cNvPr id="6" name="Slide Number Placeholder 5">
             <a:extLst>
               <a:ext uri="{FF2B5EF4-FFF2-40B4-BE49-F238E27FC236}">
-                <a16:creationId xmlns:a16="http://schemas.microsoft.com/office/drawing/2014/main" id="{AB8F3E1C-BC7B-C617-C73C-A83ECC78D469}"/>
+                <a16:creationId xmlns:a16="http://schemas.microsoft.com/office/drawing/2014/main" xmlns="" id="{AB8F3E1C-BC7B-C617-C73C-A83ECC78D469}"/>
               </a:ext>
             </a:extLst>
           </p:cNvPr>
@@ -1249,7 +1254,7 @@
           <p:cNvPr id="2" name="Title 1">
             <a:extLst>
               <a:ext uri="{FF2B5EF4-FFF2-40B4-BE49-F238E27FC236}">
-                <a16:creationId xmlns:a16="http://schemas.microsoft.com/office/drawing/2014/main" id="{F2192998-FF07-B47F-6BEA-26F2F1CAF433}"/>
+                <a16:creationId xmlns:a16="http://schemas.microsoft.com/office/drawing/2014/main" xmlns="" id="{F2192998-FF07-B47F-6BEA-26F2F1CAF433}"/>
               </a:ext>
             </a:extLst>
           </p:cNvPr>
@@ -1277,7 +1282,7 @@
           <p:cNvPr id="3" name="Content Placeholder 2">
             <a:extLst>
               <a:ext uri="{FF2B5EF4-FFF2-40B4-BE49-F238E27FC236}">
-                <a16:creationId xmlns:a16="http://schemas.microsoft.com/office/drawing/2014/main" id="{A40463DB-CB8D-9D69-E951-F95CD9B7016E}"/>
+                <a16:creationId xmlns:a16="http://schemas.microsoft.com/office/drawing/2014/main" xmlns="" id="{A40463DB-CB8D-9D69-E951-F95CD9B7016E}"/>
               </a:ext>
             </a:extLst>
           </p:cNvPr>
@@ -1339,7 +1344,7 @@
           <p:cNvPr id="4" name="Content Placeholder 3">
             <a:extLst>
               <a:ext uri="{FF2B5EF4-FFF2-40B4-BE49-F238E27FC236}">
-                <a16:creationId xmlns:a16="http://schemas.microsoft.com/office/drawing/2014/main" id="{2DEEEDDB-667D-7EB3-2A3A-CA88BC5CFC7C}"/>
+                <a16:creationId xmlns:a16="http://schemas.microsoft.com/office/drawing/2014/main" xmlns="" id="{2DEEEDDB-667D-7EB3-2A3A-CA88BC5CFC7C}"/>
               </a:ext>
             </a:extLst>
           </p:cNvPr>
@@ -1401,7 +1406,7 @@
           <p:cNvPr id="5" name="Date Placeholder 4">
             <a:extLst>
               <a:ext uri="{FF2B5EF4-FFF2-40B4-BE49-F238E27FC236}">
-                <a16:creationId xmlns:a16="http://schemas.microsoft.com/office/drawing/2014/main" id="{FA07FCCF-A09B-23C7-FD58-A276E7816B9E}"/>
+                <a16:creationId xmlns:a16="http://schemas.microsoft.com/office/drawing/2014/main" xmlns="" id="{FA07FCCF-A09B-23C7-FD58-A276E7816B9E}"/>
               </a:ext>
             </a:extLst>
           </p:cNvPr>
@@ -1419,7 +1424,7 @@
           <a:p>
             <a:fld id="{4023423A-A389-4461-8CC8-2DB9B479FB65}" type="datetimeFigureOut">
               <a:rPr lang="en-US" smtClean="0"/>
-              <a:t>9/3/2023</a:t>
+              <a:t>9/10/2025</a:t>
             </a:fld>
             <a:endParaRPr lang="en-US"/>
           </a:p>
@@ -1430,7 +1435,7 @@
           <p:cNvPr id="6" name="Footer Placeholder 5">
             <a:extLst>
               <a:ext uri="{FF2B5EF4-FFF2-40B4-BE49-F238E27FC236}">
-                <a16:creationId xmlns:a16="http://schemas.microsoft.com/office/drawing/2014/main" id="{28718BAB-72FD-A601-6448-3A862F61F9C5}"/>
+                <a16:creationId xmlns:a16="http://schemas.microsoft.com/office/drawing/2014/main" xmlns="" id="{28718BAB-72FD-A601-6448-3A862F61F9C5}"/>
               </a:ext>
             </a:extLst>
           </p:cNvPr>
@@ -1455,7 +1460,7 @@
           <p:cNvPr id="7" name="Slide Number Placeholder 6">
             <a:extLst>
               <a:ext uri="{FF2B5EF4-FFF2-40B4-BE49-F238E27FC236}">
-                <a16:creationId xmlns:a16="http://schemas.microsoft.com/office/drawing/2014/main" id="{A18CCABE-6292-84D5-2BF4-36A7FBEF742B}"/>
+                <a16:creationId xmlns:a16="http://schemas.microsoft.com/office/drawing/2014/main" xmlns="" id="{A18CCABE-6292-84D5-2BF4-36A7FBEF742B}"/>
               </a:ext>
             </a:extLst>
           </p:cNvPr>
@@ -1514,7 +1519,7 @@
           <p:cNvPr id="2" name="Title 1">
             <a:extLst>
               <a:ext uri="{FF2B5EF4-FFF2-40B4-BE49-F238E27FC236}">
-                <a16:creationId xmlns:a16="http://schemas.microsoft.com/office/drawing/2014/main" id="{E368F9FE-D44A-1330-FE48-6FD486AD633F}"/>
+                <a16:creationId xmlns:a16="http://schemas.microsoft.com/office/drawing/2014/main" xmlns="" id="{E368F9FE-D44A-1330-FE48-6FD486AD633F}"/>
               </a:ext>
             </a:extLst>
           </p:cNvPr>
@@ -1547,7 +1552,7 @@
           <p:cNvPr id="3" name="Text Placeholder 2">
             <a:extLst>
               <a:ext uri="{FF2B5EF4-FFF2-40B4-BE49-F238E27FC236}">
-                <a16:creationId xmlns:a16="http://schemas.microsoft.com/office/drawing/2014/main" id="{D759B469-710E-A933-F1FB-581AB03A22C1}"/>
+                <a16:creationId xmlns:a16="http://schemas.microsoft.com/office/drawing/2014/main" xmlns="" id="{D759B469-710E-A933-F1FB-581AB03A22C1}"/>
               </a:ext>
             </a:extLst>
           </p:cNvPr>
@@ -1618,7 +1623,7 @@
           <p:cNvPr id="4" name="Content Placeholder 3">
             <a:extLst>
               <a:ext uri="{FF2B5EF4-FFF2-40B4-BE49-F238E27FC236}">
-                <a16:creationId xmlns:a16="http://schemas.microsoft.com/office/drawing/2014/main" id="{952FCEDE-40C1-791B-AE75-891AB05B5316}"/>
+                <a16:creationId xmlns:a16="http://schemas.microsoft.com/office/drawing/2014/main" xmlns="" id="{952FCEDE-40C1-791B-AE75-891AB05B5316}"/>
               </a:ext>
             </a:extLst>
           </p:cNvPr>
@@ -1680,7 +1685,7 @@
           <p:cNvPr id="5" name="Text Placeholder 4">
             <a:extLst>
               <a:ext uri="{FF2B5EF4-FFF2-40B4-BE49-F238E27FC236}">
-                <a16:creationId xmlns:a16="http://schemas.microsoft.com/office/drawing/2014/main" id="{4A57F51D-89C8-6E31-5B99-AC5FEF88ED31}"/>
+                <a16:creationId xmlns:a16="http://schemas.microsoft.com/office/drawing/2014/main" xmlns="" id="{4A57F51D-89C8-6E31-5B99-AC5FEF88ED31}"/>
               </a:ext>
             </a:extLst>
           </p:cNvPr>
@@ -1751,7 +1756,7 @@
           <p:cNvPr id="6" name="Content Placeholder 5">
             <a:extLst>
               <a:ext uri="{FF2B5EF4-FFF2-40B4-BE49-F238E27FC236}">
-                <a16:creationId xmlns:a16="http://schemas.microsoft.com/office/drawing/2014/main" id="{874B5F32-4635-F263-F024-A4A74604DB07}"/>
+                <a16:creationId xmlns:a16="http://schemas.microsoft.com/office/drawing/2014/main" xmlns="" id="{874B5F32-4635-F263-F024-A4A74604DB07}"/>
               </a:ext>
             </a:extLst>
           </p:cNvPr>
@@ -1813,7 +1818,7 @@
           <p:cNvPr id="7" name="Date Placeholder 6">
             <a:extLst>
               <a:ext uri="{FF2B5EF4-FFF2-40B4-BE49-F238E27FC236}">
-                <a16:creationId xmlns:a16="http://schemas.microsoft.com/office/drawing/2014/main" id="{0573D5A6-E293-08DD-4189-B97E6ADA6DD2}"/>
+                <a16:creationId xmlns:a16="http://schemas.microsoft.com/office/drawing/2014/main" xmlns="" id="{0573D5A6-E293-08DD-4189-B97E6ADA6DD2}"/>
               </a:ext>
             </a:extLst>
           </p:cNvPr>
@@ -1831,7 +1836,7 @@
           <a:p>
             <a:fld id="{4023423A-A389-4461-8CC8-2DB9B479FB65}" type="datetimeFigureOut">
               <a:rPr lang="en-US" smtClean="0"/>
-              <a:t>9/3/2023</a:t>
+              <a:t>9/10/2025</a:t>
             </a:fld>
             <a:endParaRPr lang="en-US"/>
           </a:p>
@@ -1842,7 +1847,7 @@
           <p:cNvPr id="8" name="Footer Placeholder 7">
             <a:extLst>
               <a:ext uri="{FF2B5EF4-FFF2-40B4-BE49-F238E27FC236}">
-                <a16:creationId xmlns:a16="http://schemas.microsoft.com/office/drawing/2014/main" id="{018EEDAC-FAD6-4E71-8270-BA002EE0E66B}"/>
+                <a16:creationId xmlns:a16="http://schemas.microsoft.com/office/drawing/2014/main" xmlns="" id="{018EEDAC-FAD6-4E71-8270-BA002EE0E66B}"/>
               </a:ext>
             </a:extLst>
           </p:cNvPr>
@@ -1867,7 +1872,7 @@
           <p:cNvPr id="9" name="Slide Number Placeholder 8">
             <a:extLst>
               <a:ext uri="{FF2B5EF4-FFF2-40B4-BE49-F238E27FC236}">
-                <a16:creationId xmlns:a16="http://schemas.microsoft.com/office/drawing/2014/main" id="{71B10C90-1DA6-4584-5446-B8AC95DDE26C}"/>
+                <a16:creationId xmlns:a16="http://schemas.microsoft.com/office/drawing/2014/main" xmlns="" id="{71B10C90-1DA6-4584-5446-B8AC95DDE26C}"/>
               </a:ext>
             </a:extLst>
           </p:cNvPr>
@@ -1926,7 +1931,7 @@
           <p:cNvPr id="2" name="Title 1">
             <a:extLst>
               <a:ext uri="{FF2B5EF4-FFF2-40B4-BE49-F238E27FC236}">
-                <a16:creationId xmlns:a16="http://schemas.microsoft.com/office/drawing/2014/main" id="{092E0276-C138-B57A-2CF8-7579B7A5E4D2}"/>
+                <a16:creationId xmlns:a16="http://schemas.microsoft.com/office/drawing/2014/main" xmlns="" id="{092E0276-C138-B57A-2CF8-7579B7A5E4D2}"/>
               </a:ext>
             </a:extLst>
           </p:cNvPr>
@@ -1954,7 +1959,7 @@
           <p:cNvPr id="3" name="Date Placeholder 2">
             <a:extLst>
               <a:ext uri="{FF2B5EF4-FFF2-40B4-BE49-F238E27FC236}">
-                <a16:creationId xmlns:a16="http://schemas.microsoft.com/office/drawing/2014/main" id="{5F72350B-0713-3AEA-54F7-EF40B678A13D}"/>
+                <a16:creationId xmlns:a16="http://schemas.microsoft.com/office/drawing/2014/main" xmlns="" id="{5F72350B-0713-3AEA-54F7-EF40B678A13D}"/>
               </a:ext>
             </a:extLst>
           </p:cNvPr>
@@ -1972,7 +1977,7 @@
           <a:p>
             <a:fld id="{4023423A-A389-4461-8CC8-2DB9B479FB65}" type="datetimeFigureOut">
               <a:rPr lang="en-US" smtClean="0"/>
-              <a:t>9/3/2023</a:t>
+              <a:t>9/10/2025</a:t>
             </a:fld>
             <a:endParaRPr lang="en-US"/>
           </a:p>
@@ -1983,7 +1988,7 @@
           <p:cNvPr id="4" name="Footer Placeholder 3">
             <a:extLst>
               <a:ext uri="{FF2B5EF4-FFF2-40B4-BE49-F238E27FC236}">
-                <a16:creationId xmlns:a16="http://schemas.microsoft.com/office/drawing/2014/main" id="{F56A4003-F46C-60A7-418B-16E6E2FD07EE}"/>
+                <a16:creationId xmlns:a16="http://schemas.microsoft.com/office/drawing/2014/main" xmlns="" id="{F56A4003-F46C-60A7-418B-16E6E2FD07EE}"/>
               </a:ext>
             </a:extLst>
           </p:cNvPr>
@@ -2008,7 +2013,7 @@
           <p:cNvPr id="5" name="Slide Number Placeholder 4">
             <a:extLst>
               <a:ext uri="{FF2B5EF4-FFF2-40B4-BE49-F238E27FC236}">
-                <a16:creationId xmlns:a16="http://schemas.microsoft.com/office/drawing/2014/main" id="{944F4698-D56E-56F9-F05B-BDD9833E4DA6}"/>
+                <a16:creationId xmlns:a16="http://schemas.microsoft.com/office/drawing/2014/main" xmlns="" id="{944F4698-D56E-56F9-F05B-BDD9833E4DA6}"/>
               </a:ext>
             </a:extLst>
           </p:cNvPr>
@@ -2067,7 +2072,7 @@
           <p:cNvPr id="2" name="Date Placeholder 1">
             <a:extLst>
               <a:ext uri="{FF2B5EF4-FFF2-40B4-BE49-F238E27FC236}">
-                <a16:creationId xmlns:a16="http://schemas.microsoft.com/office/drawing/2014/main" id="{07DEC033-5F00-9EFC-2CDF-E947F7E11D83}"/>
+                <a16:creationId xmlns:a16="http://schemas.microsoft.com/office/drawing/2014/main" xmlns="" id="{07DEC033-5F00-9EFC-2CDF-E947F7E11D83}"/>
               </a:ext>
             </a:extLst>
           </p:cNvPr>
@@ -2085,7 +2090,7 @@
           <a:p>
             <a:fld id="{4023423A-A389-4461-8CC8-2DB9B479FB65}" type="datetimeFigureOut">
               <a:rPr lang="en-US" smtClean="0"/>
-              <a:t>9/3/2023</a:t>
+              <a:t>9/10/2025</a:t>
             </a:fld>
             <a:endParaRPr lang="en-US"/>
           </a:p>
@@ -2096,7 +2101,7 @@
           <p:cNvPr id="3" name="Footer Placeholder 2">
             <a:extLst>
               <a:ext uri="{FF2B5EF4-FFF2-40B4-BE49-F238E27FC236}">
-                <a16:creationId xmlns:a16="http://schemas.microsoft.com/office/drawing/2014/main" id="{464116BC-D506-D776-88AC-ECAB7E53A75C}"/>
+                <a16:creationId xmlns:a16="http://schemas.microsoft.com/office/drawing/2014/main" xmlns="" id="{464116BC-D506-D776-88AC-ECAB7E53A75C}"/>
               </a:ext>
             </a:extLst>
           </p:cNvPr>
@@ -2121,7 +2126,7 @@
           <p:cNvPr id="4" name="Slide Number Placeholder 3">
             <a:extLst>
               <a:ext uri="{FF2B5EF4-FFF2-40B4-BE49-F238E27FC236}">
-                <a16:creationId xmlns:a16="http://schemas.microsoft.com/office/drawing/2014/main" id="{4B55DF0C-EF36-E73E-C1B9-A1B57F50AC80}"/>
+                <a16:creationId xmlns:a16="http://schemas.microsoft.com/office/drawing/2014/main" xmlns="" id="{4B55DF0C-EF36-E73E-C1B9-A1B57F50AC80}"/>
               </a:ext>
             </a:extLst>
           </p:cNvPr>
@@ -2180,7 +2185,7 @@
           <p:cNvPr id="2" name="Title 1">
             <a:extLst>
               <a:ext uri="{FF2B5EF4-FFF2-40B4-BE49-F238E27FC236}">
-                <a16:creationId xmlns:a16="http://schemas.microsoft.com/office/drawing/2014/main" id="{5834031D-8351-1422-C109-3D2AC19B3149}"/>
+                <a16:creationId xmlns:a16="http://schemas.microsoft.com/office/drawing/2014/main" xmlns="" id="{5834031D-8351-1422-C109-3D2AC19B3149}"/>
               </a:ext>
             </a:extLst>
           </p:cNvPr>
@@ -2217,7 +2222,7 @@
           <p:cNvPr id="3" name="Content Placeholder 2">
             <a:extLst>
               <a:ext uri="{FF2B5EF4-FFF2-40B4-BE49-F238E27FC236}">
-                <a16:creationId xmlns:a16="http://schemas.microsoft.com/office/drawing/2014/main" id="{0B571CF9-1F0A-E403-9866-A294EF1C5852}"/>
+                <a16:creationId xmlns:a16="http://schemas.microsoft.com/office/drawing/2014/main" xmlns="" id="{0B571CF9-1F0A-E403-9866-A294EF1C5852}"/>
               </a:ext>
             </a:extLst>
           </p:cNvPr>
@@ -2307,7 +2312,7 @@
           <p:cNvPr id="4" name="Text Placeholder 3">
             <a:extLst>
               <a:ext uri="{FF2B5EF4-FFF2-40B4-BE49-F238E27FC236}">
-                <a16:creationId xmlns:a16="http://schemas.microsoft.com/office/drawing/2014/main" id="{F9503787-39C1-47A8-C88B-568A0781606B}"/>
+                <a16:creationId xmlns:a16="http://schemas.microsoft.com/office/drawing/2014/main" xmlns="" id="{F9503787-39C1-47A8-C88B-568A0781606B}"/>
               </a:ext>
             </a:extLst>
           </p:cNvPr>
@@ -2378,7 +2383,7 @@
           <p:cNvPr id="5" name="Date Placeholder 4">
             <a:extLst>
               <a:ext uri="{FF2B5EF4-FFF2-40B4-BE49-F238E27FC236}">
-                <a16:creationId xmlns:a16="http://schemas.microsoft.com/office/drawing/2014/main" id="{573DB9D4-65BD-5F74-66E5-AE8E7E0CA4CE}"/>
+                <a16:creationId xmlns:a16="http://schemas.microsoft.com/office/drawing/2014/main" xmlns="" id="{573DB9D4-65BD-5F74-66E5-AE8E7E0CA4CE}"/>
               </a:ext>
             </a:extLst>
           </p:cNvPr>
@@ -2396,7 +2401,7 @@
           <a:p>
             <a:fld id="{4023423A-A389-4461-8CC8-2DB9B479FB65}" type="datetimeFigureOut">
               <a:rPr lang="en-US" smtClean="0"/>
-              <a:t>9/3/2023</a:t>
+              <a:t>9/10/2025</a:t>
             </a:fld>
             <a:endParaRPr lang="en-US"/>
           </a:p>
@@ -2407,7 +2412,7 @@
           <p:cNvPr id="6" name="Footer Placeholder 5">
             <a:extLst>
               <a:ext uri="{FF2B5EF4-FFF2-40B4-BE49-F238E27FC236}">
-                <a16:creationId xmlns:a16="http://schemas.microsoft.com/office/drawing/2014/main" id="{90F8109E-B534-6AEB-5909-DF4C1EF7CD31}"/>
+                <a16:creationId xmlns:a16="http://schemas.microsoft.com/office/drawing/2014/main" xmlns="" id="{90F8109E-B534-6AEB-5909-DF4C1EF7CD31}"/>
               </a:ext>
             </a:extLst>
           </p:cNvPr>
@@ -2432,7 +2437,7 @@
           <p:cNvPr id="7" name="Slide Number Placeholder 6">
             <a:extLst>
               <a:ext uri="{FF2B5EF4-FFF2-40B4-BE49-F238E27FC236}">
-                <a16:creationId xmlns:a16="http://schemas.microsoft.com/office/drawing/2014/main" id="{908CED3F-E55C-B4EF-935C-15FB2CCBFEA6}"/>
+                <a16:creationId xmlns:a16="http://schemas.microsoft.com/office/drawing/2014/main" xmlns="" id="{908CED3F-E55C-B4EF-935C-15FB2CCBFEA6}"/>
               </a:ext>
             </a:extLst>
           </p:cNvPr>
@@ -2491,7 +2496,7 @@
           <p:cNvPr id="2" name="Title 1">
             <a:extLst>
               <a:ext uri="{FF2B5EF4-FFF2-40B4-BE49-F238E27FC236}">
-                <a16:creationId xmlns:a16="http://schemas.microsoft.com/office/drawing/2014/main" id="{2DCD266D-8CB5-7CE9-7AA4-C0A67177023F}"/>
+                <a16:creationId xmlns:a16="http://schemas.microsoft.com/office/drawing/2014/main" xmlns="" id="{2DCD266D-8CB5-7CE9-7AA4-C0A67177023F}"/>
               </a:ext>
             </a:extLst>
           </p:cNvPr>
@@ -2528,7 +2533,7 @@
           <p:cNvPr id="3" name="Picture Placeholder 2">
             <a:extLst>
               <a:ext uri="{FF2B5EF4-FFF2-40B4-BE49-F238E27FC236}">
-                <a16:creationId xmlns:a16="http://schemas.microsoft.com/office/drawing/2014/main" id="{79036E9F-C00C-F6B5-AF62-2B87BF6E0B61}"/>
+                <a16:creationId xmlns:a16="http://schemas.microsoft.com/office/drawing/2014/main" xmlns="" id="{79036E9F-C00C-F6B5-AF62-2B87BF6E0B61}"/>
               </a:ext>
             </a:extLst>
           </p:cNvPr>
@@ -2595,7 +2600,7 @@
           <p:cNvPr id="4" name="Text Placeholder 3">
             <a:extLst>
               <a:ext uri="{FF2B5EF4-FFF2-40B4-BE49-F238E27FC236}">
-                <a16:creationId xmlns:a16="http://schemas.microsoft.com/office/drawing/2014/main" id="{73EC6980-374C-44AF-5D27-B9BF11239131}"/>
+                <a16:creationId xmlns:a16="http://schemas.microsoft.com/office/drawing/2014/main" xmlns="" id="{73EC6980-374C-44AF-5D27-B9BF11239131}"/>
               </a:ext>
             </a:extLst>
           </p:cNvPr>
@@ -2666,7 +2671,7 @@
           <p:cNvPr id="5" name="Date Placeholder 4">
             <a:extLst>
               <a:ext uri="{FF2B5EF4-FFF2-40B4-BE49-F238E27FC236}">
-                <a16:creationId xmlns:a16="http://schemas.microsoft.com/office/drawing/2014/main" id="{B28799DA-40C2-19BD-1E03-91136970C473}"/>
+                <a16:creationId xmlns:a16="http://schemas.microsoft.com/office/drawing/2014/main" xmlns="" id="{B28799DA-40C2-19BD-1E03-91136970C473}"/>
               </a:ext>
             </a:extLst>
           </p:cNvPr>
@@ -2684,7 +2689,7 @@
           <a:p>
             <a:fld id="{4023423A-A389-4461-8CC8-2DB9B479FB65}" type="datetimeFigureOut">
               <a:rPr lang="en-US" smtClean="0"/>
-              <a:t>9/3/2023</a:t>
+              <a:t>9/10/2025</a:t>
             </a:fld>
             <a:endParaRPr lang="en-US"/>
           </a:p>
@@ -2695,7 +2700,7 @@
           <p:cNvPr id="6" name="Footer Placeholder 5">
             <a:extLst>
               <a:ext uri="{FF2B5EF4-FFF2-40B4-BE49-F238E27FC236}">
-                <a16:creationId xmlns:a16="http://schemas.microsoft.com/office/drawing/2014/main" id="{40376B8F-DBCE-050B-E43D-43ADF1D07EAE}"/>
+                <a16:creationId xmlns:a16="http://schemas.microsoft.com/office/drawing/2014/main" xmlns="" id="{40376B8F-DBCE-050B-E43D-43ADF1D07EAE}"/>
               </a:ext>
             </a:extLst>
           </p:cNvPr>
@@ -2720,7 +2725,7 @@
           <p:cNvPr id="7" name="Slide Number Placeholder 6">
             <a:extLst>
               <a:ext uri="{FF2B5EF4-FFF2-40B4-BE49-F238E27FC236}">
-                <a16:creationId xmlns:a16="http://schemas.microsoft.com/office/drawing/2014/main" id="{5F80A8AE-3411-38BA-6639-44BA39EC0C85}"/>
+                <a16:creationId xmlns:a16="http://schemas.microsoft.com/office/drawing/2014/main" xmlns="" id="{5F80A8AE-3411-38BA-6639-44BA39EC0C85}"/>
               </a:ext>
             </a:extLst>
           </p:cNvPr>
@@ -2784,7 +2789,7 @@
           <p:cNvPr id="2" name="Title Placeholder 1">
             <a:extLst>
               <a:ext uri="{FF2B5EF4-FFF2-40B4-BE49-F238E27FC236}">
-                <a16:creationId xmlns:a16="http://schemas.microsoft.com/office/drawing/2014/main" id="{59CA683E-D952-AA16-0257-8043E22188CC}"/>
+                <a16:creationId xmlns:a16="http://schemas.microsoft.com/office/drawing/2014/main" xmlns="" id="{59CA683E-D952-AA16-0257-8043E22188CC}"/>
               </a:ext>
             </a:extLst>
           </p:cNvPr>
@@ -2822,7 +2827,7 @@
           <p:cNvPr id="3" name="Text Placeholder 2">
             <a:extLst>
               <a:ext uri="{FF2B5EF4-FFF2-40B4-BE49-F238E27FC236}">
-                <a16:creationId xmlns:a16="http://schemas.microsoft.com/office/drawing/2014/main" id="{35DD7E81-ACFD-C1AC-60FE-5F346E32A364}"/>
+                <a16:creationId xmlns:a16="http://schemas.microsoft.com/office/drawing/2014/main" xmlns="" id="{35DD7E81-ACFD-C1AC-60FE-5F346E32A364}"/>
               </a:ext>
             </a:extLst>
           </p:cNvPr>
@@ -2889,7 +2894,7 @@
           <p:cNvPr id="4" name="Date Placeholder 3">
             <a:extLst>
               <a:ext uri="{FF2B5EF4-FFF2-40B4-BE49-F238E27FC236}">
-                <a16:creationId xmlns:a16="http://schemas.microsoft.com/office/drawing/2014/main" id="{E9B55ABF-F62E-FCD7-5D90-CD60A1C10324}"/>
+                <a16:creationId xmlns:a16="http://schemas.microsoft.com/office/drawing/2014/main" xmlns="" id="{E9B55ABF-F62E-FCD7-5D90-CD60A1C10324}"/>
               </a:ext>
             </a:extLst>
           </p:cNvPr>
@@ -2925,7 +2930,7 @@
           <a:p>
             <a:fld id="{4023423A-A389-4461-8CC8-2DB9B479FB65}" type="datetimeFigureOut">
               <a:rPr lang="en-US" smtClean="0"/>
-              <a:t>9/3/2023</a:t>
+              <a:t>9/10/2025</a:t>
             </a:fld>
             <a:endParaRPr lang="en-US"/>
           </a:p>
@@ -2936,7 +2941,7 @@
           <p:cNvPr id="5" name="Footer Placeholder 4">
             <a:extLst>
               <a:ext uri="{FF2B5EF4-FFF2-40B4-BE49-F238E27FC236}">
-                <a16:creationId xmlns:a16="http://schemas.microsoft.com/office/drawing/2014/main" id="{3278FE95-D0D0-1D48-133B-D21DA0454858}"/>
+                <a16:creationId xmlns:a16="http://schemas.microsoft.com/office/drawing/2014/main" xmlns="" id="{3278FE95-D0D0-1D48-133B-D21DA0454858}"/>
               </a:ext>
             </a:extLst>
           </p:cNvPr>
@@ -2979,7 +2984,7 @@
           <p:cNvPr id="6" name="Slide Number Placeholder 5">
             <a:extLst>
               <a:ext uri="{FF2B5EF4-FFF2-40B4-BE49-F238E27FC236}">
-                <a16:creationId xmlns:a16="http://schemas.microsoft.com/office/drawing/2014/main" id="{50430D8C-848C-BE24-D785-6E3E5787CB0B}"/>
+                <a16:creationId xmlns:a16="http://schemas.microsoft.com/office/drawing/2014/main" xmlns="" id="{50430D8C-848C-BE24-D785-6E3E5787CB0B}"/>
               </a:ext>
             </a:extLst>
           </p:cNvPr>
@@ -3347,7 +3352,7 @@
           <p:cNvPr id="2" name="Title 1">
             <a:extLst>
               <a:ext uri="{FF2B5EF4-FFF2-40B4-BE49-F238E27FC236}">
-                <a16:creationId xmlns:a16="http://schemas.microsoft.com/office/drawing/2014/main" id="{9FB293EC-B005-3128-6313-E5DBC3B07965}"/>
+                <a16:creationId xmlns:a16="http://schemas.microsoft.com/office/drawing/2014/main" xmlns="" id="{9FB293EC-B005-3128-6313-E5DBC3B07965}"/>
               </a:ext>
             </a:extLst>
           </p:cNvPr>
@@ -3375,7 +3380,7 @@
           <p:cNvPr id="3" name="Subtitle 2">
             <a:extLst>
               <a:ext uri="{FF2B5EF4-FFF2-40B4-BE49-F238E27FC236}">
-                <a16:creationId xmlns:a16="http://schemas.microsoft.com/office/drawing/2014/main" id="{75BC5256-06E7-ECC3-C1EB-67C804E9405F}"/>
+                <a16:creationId xmlns:a16="http://schemas.microsoft.com/office/drawing/2014/main" xmlns="" id="{75BC5256-06E7-ECC3-C1EB-67C804E9405F}"/>
               </a:ext>
             </a:extLst>
           </p:cNvPr>
@@ -3433,7 +3438,7 @@
           <p:cNvPr id="2" name="Title 1">
             <a:extLst>
               <a:ext uri="{FF2B5EF4-FFF2-40B4-BE49-F238E27FC236}">
-                <a16:creationId xmlns:a16="http://schemas.microsoft.com/office/drawing/2014/main" id="{5D72556E-AC32-60BD-EBB0-39108B99603B}"/>
+                <a16:creationId xmlns:a16="http://schemas.microsoft.com/office/drawing/2014/main" xmlns="" id="{5D72556E-AC32-60BD-EBB0-39108B99603B}"/>
               </a:ext>
             </a:extLst>
           </p:cNvPr>
@@ -3461,7 +3466,7 @@
           <p:cNvPr id="3" name="Content Placeholder 2">
             <a:extLst>
               <a:ext uri="{FF2B5EF4-FFF2-40B4-BE49-F238E27FC236}">
-                <a16:creationId xmlns:a16="http://schemas.microsoft.com/office/drawing/2014/main" id="{E8CB9FA4-0DD9-73BA-E3CA-95A43A194C3D}"/>
+                <a16:creationId xmlns:a16="http://schemas.microsoft.com/office/drawing/2014/main" xmlns="" id="{E8CB9FA4-0DD9-73BA-E3CA-95A43A194C3D}"/>
               </a:ext>
             </a:extLst>
           </p:cNvPr>
@@ -3586,7 +3591,7 @@
           <p:cNvPr id="2" name="Title 1">
             <a:extLst>
               <a:ext uri="{FF2B5EF4-FFF2-40B4-BE49-F238E27FC236}">
-                <a16:creationId xmlns:a16="http://schemas.microsoft.com/office/drawing/2014/main" id="{EABAA1BD-B6B5-0E8A-8714-4AC6520F9B9B}"/>
+                <a16:creationId xmlns:a16="http://schemas.microsoft.com/office/drawing/2014/main" xmlns="" id="{EABAA1BD-B6B5-0E8A-8714-4AC6520F9B9B}"/>
               </a:ext>
             </a:extLst>
           </p:cNvPr>
@@ -3614,7 +3619,7 @@
           <p:cNvPr id="3" name="Content Placeholder 2">
             <a:extLst>
               <a:ext uri="{FF2B5EF4-FFF2-40B4-BE49-F238E27FC236}">
-                <a16:creationId xmlns:a16="http://schemas.microsoft.com/office/drawing/2014/main" id="{CC338141-7DF0-337F-34B4-BF8149611BBC}"/>
+                <a16:creationId xmlns:a16="http://schemas.microsoft.com/office/drawing/2014/main" xmlns="" id="{CC338141-7DF0-337F-34B4-BF8149611BBC}"/>
               </a:ext>
             </a:extLst>
           </p:cNvPr>
@@ -3723,7 +3728,7 @@
           <p:cNvPr id="2" name="Title 1">
             <a:extLst>
               <a:ext uri="{FF2B5EF4-FFF2-40B4-BE49-F238E27FC236}">
-                <a16:creationId xmlns:a16="http://schemas.microsoft.com/office/drawing/2014/main" id="{B4D130A0-5558-AE75-CA92-4495EA07A868}"/>
+                <a16:creationId xmlns:a16="http://schemas.microsoft.com/office/drawing/2014/main" xmlns="" id="{B4D130A0-5558-AE75-CA92-4495EA07A868}"/>
               </a:ext>
             </a:extLst>
           </p:cNvPr>
@@ -3751,7 +3756,7 @@
           <p:cNvPr id="3" name="Content Placeholder 2">
             <a:extLst>
               <a:ext uri="{FF2B5EF4-FFF2-40B4-BE49-F238E27FC236}">
-                <a16:creationId xmlns:a16="http://schemas.microsoft.com/office/drawing/2014/main" id="{935F47BE-9735-AF6F-3563-24FA7B77FDEF}"/>
+                <a16:creationId xmlns:a16="http://schemas.microsoft.com/office/drawing/2014/main" xmlns="" id="{935F47BE-9735-AF6F-3563-24FA7B77FDEF}"/>
               </a:ext>
             </a:extLst>
           </p:cNvPr>
@@ -3830,16 +3835,17 @@
             <a:pPr lvl="1"/>
             <a:r>
               <a:rPr lang="en-US" dirty="0"/>
-              <a:t>Truncate  not Destroy  structure of table but Drop Destroy   Structure of </a:t>
-            </a:r>
-            <a:r>
-              <a:rPr lang="en-US" dirty="0" err="1"/>
-              <a:t>Tablel</a:t>
-            </a:r>
-            <a:r>
-              <a:rPr lang="en-US" dirty="0"/>
-              <a:t>.</a:t>
-            </a:r>
+              <a:t>Truncate  not Destroy  structure of table but Drop Destroy   Structure </a:t>
+            </a:r>
+            <a:r>
+              <a:rPr lang="en-US"/>
+              <a:t>of </a:t>
+            </a:r>
+            <a:r>
+              <a:rPr lang="en-US" smtClean="0"/>
+              <a:t>Table.</a:t>
+            </a:r>
+            <a:endParaRPr lang="en-US" dirty="0"/>
           </a:p>
           <a:p>
             <a:pPr lvl="1"/>
@@ -3882,7 +3888,7 @@
           <p:cNvPr id="2" name="Title 1">
             <a:extLst>
               <a:ext uri="{FF2B5EF4-FFF2-40B4-BE49-F238E27FC236}">
-                <a16:creationId xmlns:a16="http://schemas.microsoft.com/office/drawing/2014/main" id="{EA4D54A7-20CE-5058-F4CD-41047AB6222E}"/>
+                <a16:creationId xmlns:a16="http://schemas.microsoft.com/office/drawing/2014/main" xmlns="" id="{EA4D54A7-20CE-5058-F4CD-41047AB6222E}"/>
               </a:ext>
             </a:extLst>
           </p:cNvPr>
@@ -3910,7 +3916,7 @@
           <p:cNvPr id="3" name="Content Placeholder 2">
             <a:extLst>
               <a:ext uri="{FF2B5EF4-FFF2-40B4-BE49-F238E27FC236}">
-                <a16:creationId xmlns:a16="http://schemas.microsoft.com/office/drawing/2014/main" id="{26B6444E-3DD2-4783-7FA3-139C970AC056}"/>
+                <a16:creationId xmlns:a16="http://schemas.microsoft.com/office/drawing/2014/main" xmlns="" id="{26B6444E-3DD2-4783-7FA3-139C970AC056}"/>
               </a:ext>
             </a:extLst>
           </p:cNvPr>
@@ -4070,7 +4076,7 @@
           <p:cNvPr id="2" name="Title 1">
             <a:extLst>
               <a:ext uri="{FF2B5EF4-FFF2-40B4-BE49-F238E27FC236}">
-                <a16:creationId xmlns:a16="http://schemas.microsoft.com/office/drawing/2014/main" id="{4A14328E-AA32-BD33-7A3B-72503E2E6851}"/>
+                <a16:creationId xmlns:a16="http://schemas.microsoft.com/office/drawing/2014/main" xmlns="" id="{4A14328E-AA32-BD33-7A3B-72503E2E6851}"/>
               </a:ext>
             </a:extLst>
           </p:cNvPr>
@@ -4098,7 +4104,7 @@
           <p:cNvPr id="3" name="Content Placeholder 2">
             <a:extLst>
               <a:ext uri="{FF2B5EF4-FFF2-40B4-BE49-F238E27FC236}">
-                <a16:creationId xmlns:a16="http://schemas.microsoft.com/office/drawing/2014/main" id="{915F9A7A-900E-8E95-39F1-39F8CB0F4F9B}"/>
+                <a16:creationId xmlns:a16="http://schemas.microsoft.com/office/drawing/2014/main" xmlns="" id="{915F9A7A-900E-8E95-39F1-39F8CB0F4F9B}"/>
               </a:ext>
             </a:extLst>
           </p:cNvPr>
@@ -4293,7 +4299,7 @@
           <p:cNvPr id="2" name="Title 1">
             <a:extLst>
               <a:ext uri="{FF2B5EF4-FFF2-40B4-BE49-F238E27FC236}">
-                <a16:creationId xmlns:a16="http://schemas.microsoft.com/office/drawing/2014/main" id="{DCD759C9-A47D-AFF3-676E-AF991983CCE6}"/>
+                <a16:creationId xmlns:a16="http://schemas.microsoft.com/office/drawing/2014/main" xmlns="" id="{DCD759C9-A47D-AFF3-676E-AF991983CCE6}"/>
               </a:ext>
             </a:extLst>
           </p:cNvPr>
@@ -4321,7 +4327,7 @@
           <p:cNvPr id="3" name="Content Placeholder 2">
             <a:extLst>
               <a:ext uri="{FF2B5EF4-FFF2-40B4-BE49-F238E27FC236}">
-                <a16:creationId xmlns:a16="http://schemas.microsoft.com/office/drawing/2014/main" id="{F95A035A-4A28-8C73-2AF0-DDC9FD3456BF}"/>
+                <a16:creationId xmlns:a16="http://schemas.microsoft.com/office/drawing/2014/main" xmlns="" id="{F95A035A-4A28-8C73-2AF0-DDC9FD3456BF}"/>
               </a:ext>
             </a:extLst>
           </p:cNvPr>
@@ -4426,7 +4432,7 @@
           <p:cNvPr id="2" name="Title 1">
             <a:extLst>
               <a:ext uri="{FF2B5EF4-FFF2-40B4-BE49-F238E27FC236}">
-                <a16:creationId xmlns:a16="http://schemas.microsoft.com/office/drawing/2014/main" id="{EDD8D1AE-4D3E-07EA-4185-A5B82412C1F3}"/>
+                <a16:creationId xmlns:a16="http://schemas.microsoft.com/office/drawing/2014/main" xmlns="" id="{EDD8D1AE-4D3E-07EA-4185-A5B82412C1F3}"/>
               </a:ext>
             </a:extLst>
           </p:cNvPr>
@@ -4454,7 +4460,7 @@
           <p:cNvPr id="3" name="Content Placeholder 2">
             <a:extLst>
               <a:ext uri="{FF2B5EF4-FFF2-40B4-BE49-F238E27FC236}">
-                <a16:creationId xmlns:a16="http://schemas.microsoft.com/office/drawing/2014/main" id="{0456D19A-9D89-E596-DA0E-9803020E487F}"/>
+                <a16:creationId xmlns:a16="http://schemas.microsoft.com/office/drawing/2014/main" xmlns="" id="{0456D19A-9D89-E596-DA0E-9803020E487F}"/>
               </a:ext>
             </a:extLst>
           </p:cNvPr>
@@ -4577,7 +4583,7 @@
           <p:cNvPr id="4" name="Rectangle 1">
             <a:extLst>
               <a:ext uri="{FF2B5EF4-FFF2-40B4-BE49-F238E27FC236}">
-                <a16:creationId xmlns:a16="http://schemas.microsoft.com/office/drawing/2014/main" id="{537516DF-B0A3-CD7F-C814-ED317EFCAD6F}"/>
+                <a16:creationId xmlns:a16="http://schemas.microsoft.com/office/drawing/2014/main" xmlns="" id="{537516DF-B0A3-CD7F-C814-ED317EFCAD6F}"/>
               </a:ext>
             </a:extLst>
           </p:cNvPr>
@@ -4848,7 +4854,7 @@
           <p:cNvPr id="2" name="Title 1">
             <a:extLst>
               <a:ext uri="{FF2B5EF4-FFF2-40B4-BE49-F238E27FC236}">
-                <a16:creationId xmlns:a16="http://schemas.microsoft.com/office/drawing/2014/main" id="{424E9CC4-9678-E0B2-3C77-7586B976E0C5}"/>
+                <a16:creationId xmlns:a16="http://schemas.microsoft.com/office/drawing/2014/main" xmlns="" id="{424E9CC4-9678-E0B2-3C77-7586B976E0C5}"/>
               </a:ext>
             </a:extLst>
           </p:cNvPr>
@@ -4873,7 +4879,7 @@
           <p:cNvPr id="3" name="Content Placeholder 2">
             <a:extLst>
               <a:ext uri="{FF2B5EF4-FFF2-40B4-BE49-F238E27FC236}">
-                <a16:creationId xmlns:a16="http://schemas.microsoft.com/office/drawing/2014/main" id="{E5D7EDC8-ECBC-406E-14FC-DBA450718FF7}"/>
+                <a16:creationId xmlns:a16="http://schemas.microsoft.com/office/drawing/2014/main" xmlns="" id="{E5D7EDC8-ECBC-406E-14FC-DBA450718FF7}"/>
               </a:ext>
             </a:extLst>
           </p:cNvPr>
@@ -4898,7 +4904,7 @@
           <p:cNvPr id="6146" name="Picture 2" descr="How to use ORDER BY in SQL">
             <a:extLst>
               <a:ext uri="{FF2B5EF4-FFF2-40B4-BE49-F238E27FC236}">
-                <a16:creationId xmlns:a16="http://schemas.microsoft.com/office/drawing/2014/main" id="{C075D39A-3C97-17E7-4354-C6785F5D3D07}"/>
+                <a16:creationId xmlns:a16="http://schemas.microsoft.com/office/drawing/2014/main" xmlns="" id="{C075D39A-3C97-17E7-4354-C6785F5D3D07}"/>
               </a:ext>
             </a:extLst>
           </p:cNvPr>
@@ -4975,7 +4981,7 @@
           <p:cNvPr id="2" name="Title 1">
             <a:extLst>
               <a:ext uri="{FF2B5EF4-FFF2-40B4-BE49-F238E27FC236}">
-                <a16:creationId xmlns:a16="http://schemas.microsoft.com/office/drawing/2014/main" id="{76BA99F2-7745-1539-ADD3-6588AF7CBBFC}"/>
+                <a16:creationId xmlns:a16="http://schemas.microsoft.com/office/drawing/2014/main" xmlns="" id="{76BA99F2-7745-1539-ADD3-6588AF7CBBFC}"/>
               </a:ext>
             </a:extLst>
           </p:cNvPr>
@@ -5003,7 +5009,7 @@
           <p:cNvPr id="3" name="Content Placeholder 2">
             <a:extLst>
               <a:ext uri="{FF2B5EF4-FFF2-40B4-BE49-F238E27FC236}">
-                <a16:creationId xmlns:a16="http://schemas.microsoft.com/office/drawing/2014/main" id="{62F14E74-9895-B469-13EC-8E59A39E5EB1}"/>
+                <a16:creationId xmlns:a16="http://schemas.microsoft.com/office/drawing/2014/main" xmlns="" id="{62F14E74-9895-B469-13EC-8E59A39E5EB1}"/>
               </a:ext>
             </a:extLst>
           </p:cNvPr>
@@ -5017,7 +5023,7 @@
         <p:spPr/>
         <p:txBody>
           <a:bodyPr>
-            <a:normAutofit fontScale="92500" lnSpcReduction="20000"/>
+            <a:normAutofit fontScale="85000" lnSpcReduction="10000"/>
           </a:bodyPr>
           <a:lstStyle/>
           <a:p>
@@ -5185,7 +5191,7 @@
           <p:cNvPr id="4" name="Rectangle 1">
             <a:extLst>
               <a:ext uri="{FF2B5EF4-FFF2-40B4-BE49-F238E27FC236}">
-                <a16:creationId xmlns:a16="http://schemas.microsoft.com/office/drawing/2014/main" id="{AC9DD616-A369-CEAA-3C9D-FE2C15721569}"/>
+                <a16:creationId xmlns:a16="http://schemas.microsoft.com/office/drawing/2014/main" xmlns="" id="{AC9DD616-A369-CEAA-3C9D-FE2C15721569}"/>
               </a:ext>
             </a:extLst>
           </p:cNvPr>
@@ -5444,7 +5450,7 @@
           <p:cNvPr id="2" name="Title 1">
             <a:extLst>
               <a:ext uri="{FF2B5EF4-FFF2-40B4-BE49-F238E27FC236}">
-                <a16:creationId xmlns:a16="http://schemas.microsoft.com/office/drawing/2014/main" id="{8FA14BF7-E015-418C-9C70-4940601A2DB5}"/>
+                <a16:creationId xmlns:a16="http://schemas.microsoft.com/office/drawing/2014/main" xmlns="" id="{8FA14BF7-E015-418C-9C70-4940601A2DB5}"/>
               </a:ext>
             </a:extLst>
           </p:cNvPr>
@@ -5469,7 +5475,7 @@
           <p:cNvPr id="3" name="Content Placeholder 2">
             <a:extLst>
               <a:ext uri="{FF2B5EF4-FFF2-40B4-BE49-F238E27FC236}">
-                <a16:creationId xmlns:a16="http://schemas.microsoft.com/office/drawing/2014/main" id="{7FBF387B-A49E-E770-1018-8244C2FE7017}"/>
+                <a16:creationId xmlns:a16="http://schemas.microsoft.com/office/drawing/2014/main" xmlns="" id="{7FBF387B-A49E-E770-1018-8244C2FE7017}"/>
               </a:ext>
             </a:extLst>
           </p:cNvPr>
@@ -5494,7 +5500,7 @@
           <p:cNvPr id="8194" name="Picture 2" descr="How to use GROUP BY clause in SQL">
             <a:extLst>
               <a:ext uri="{FF2B5EF4-FFF2-40B4-BE49-F238E27FC236}">
-                <a16:creationId xmlns:a16="http://schemas.microsoft.com/office/drawing/2014/main" id="{A8B67177-023F-C878-BC2B-603A0C58DBBC}"/>
+                <a16:creationId xmlns:a16="http://schemas.microsoft.com/office/drawing/2014/main" xmlns="" id="{A8B67177-023F-C878-BC2B-603A0C58DBBC}"/>
               </a:ext>
             </a:extLst>
           </p:cNvPr>
@@ -5571,7 +5577,7 @@
           <p:cNvPr id="2" name="Title 1">
             <a:extLst>
               <a:ext uri="{FF2B5EF4-FFF2-40B4-BE49-F238E27FC236}">
-                <a16:creationId xmlns:a16="http://schemas.microsoft.com/office/drawing/2014/main" id="{B6CD9F1C-7A1C-2A55-703E-33603048743E}"/>
+                <a16:creationId xmlns:a16="http://schemas.microsoft.com/office/drawing/2014/main" xmlns="" id="{B6CD9F1C-7A1C-2A55-703E-33603048743E}"/>
               </a:ext>
             </a:extLst>
           </p:cNvPr>
@@ -5599,7 +5605,7 @@
           <p:cNvPr id="3" name="Content Placeholder 2">
             <a:extLst>
               <a:ext uri="{FF2B5EF4-FFF2-40B4-BE49-F238E27FC236}">
-                <a16:creationId xmlns:a16="http://schemas.microsoft.com/office/drawing/2014/main" id="{B94A6086-E549-F9D1-0CAC-0860B98A13CA}"/>
+                <a16:creationId xmlns:a16="http://schemas.microsoft.com/office/drawing/2014/main" xmlns="" id="{B94A6086-E549-F9D1-0CAC-0860B98A13CA}"/>
               </a:ext>
             </a:extLst>
           </p:cNvPr>
@@ -5774,7 +5780,7 @@
           <p:cNvPr id="2" name="Title 1">
             <a:extLst>
               <a:ext uri="{FF2B5EF4-FFF2-40B4-BE49-F238E27FC236}">
-                <a16:creationId xmlns:a16="http://schemas.microsoft.com/office/drawing/2014/main" id="{51A4A336-FD79-6AC1-8483-539E1EB4B954}"/>
+                <a16:creationId xmlns:a16="http://schemas.microsoft.com/office/drawing/2014/main" xmlns="" id="{51A4A336-FD79-6AC1-8483-539E1EB4B954}"/>
               </a:ext>
             </a:extLst>
           </p:cNvPr>
@@ -5802,7 +5808,7 @@
           <p:cNvPr id="3" name="Content Placeholder 2">
             <a:extLst>
               <a:ext uri="{FF2B5EF4-FFF2-40B4-BE49-F238E27FC236}">
-                <a16:creationId xmlns:a16="http://schemas.microsoft.com/office/drawing/2014/main" id="{2007298A-4707-38FA-5DF2-A9E2BF23E108}"/>
+                <a16:creationId xmlns:a16="http://schemas.microsoft.com/office/drawing/2014/main" xmlns="" id="{2007298A-4707-38FA-5DF2-A9E2BF23E108}"/>
               </a:ext>
             </a:extLst>
           </p:cNvPr>
@@ -6167,7 +6173,7 @@
           <p:cNvPr id="6" name="Rectangle 3">
             <a:extLst>
               <a:ext uri="{FF2B5EF4-FFF2-40B4-BE49-F238E27FC236}">
-                <a16:creationId xmlns:a16="http://schemas.microsoft.com/office/drawing/2014/main" id="{9DB339C4-D19C-F475-D545-B90CF0DAAF1F}"/>
+                <a16:creationId xmlns:a16="http://schemas.microsoft.com/office/drawing/2014/main" xmlns="" id="{9DB339C4-D19C-F475-D545-B90CF0DAAF1F}"/>
               </a:ext>
             </a:extLst>
           </p:cNvPr>
@@ -6314,7 +6320,7 @@
           <p:cNvPr id="2" name="Title 1">
             <a:extLst>
               <a:ext uri="{FF2B5EF4-FFF2-40B4-BE49-F238E27FC236}">
-                <a16:creationId xmlns:a16="http://schemas.microsoft.com/office/drawing/2014/main" id="{99786741-F0A7-3296-7F02-E92D0A3492DD}"/>
+                <a16:creationId xmlns:a16="http://schemas.microsoft.com/office/drawing/2014/main" xmlns="" id="{99786741-F0A7-3296-7F02-E92D0A3492DD}"/>
               </a:ext>
             </a:extLst>
           </p:cNvPr>
@@ -6342,7 +6348,7 @@
           <p:cNvPr id="3" name="Content Placeholder 2">
             <a:extLst>
               <a:ext uri="{FF2B5EF4-FFF2-40B4-BE49-F238E27FC236}">
-                <a16:creationId xmlns:a16="http://schemas.microsoft.com/office/drawing/2014/main" id="{7A759DBA-97C5-FFAC-7C9C-1BDF8EF24D56}"/>
+                <a16:creationId xmlns:a16="http://schemas.microsoft.com/office/drawing/2014/main" xmlns="" id="{7A759DBA-97C5-FFAC-7C9C-1BDF8EF24D56}"/>
               </a:ext>
             </a:extLst>
           </p:cNvPr>
@@ -6462,7 +6468,7 @@
           <p:cNvPr id="2" name="Title 1">
             <a:extLst>
               <a:ext uri="{FF2B5EF4-FFF2-40B4-BE49-F238E27FC236}">
-                <a16:creationId xmlns:a16="http://schemas.microsoft.com/office/drawing/2014/main" id="{25DB7500-0728-2BFB-7E05-63FE75B562C2}"/>
+                <a16:creationId xmlns:a16="http://schemas.microsoft.com/office/drawing/2014/main" xmlns="" id="{25DB7500-0728-2BFB-7E05-63FE75B562C2}"/>
               </a:ext>
             </a:extLst>
           </p:cNvPr>
@@ -6487,7 +6493,7 @@
           <p:cNvPr id="3" name="Content Placeholder 2">
             <a:extLst>
               <a:ext uri="{FF2B5EF4-FFF2-40B4-BE49-F238E27FC236}">
-                <a16:creationId xmlns:a16="http://schemas.microsoft.com/office/drawing/2014/main" id="{717A641C-0955-D46D-9F60-A7BC9BD4544D}"/>
+                <a16:creationId xmlns:a16="http://schemas.microsoft.com/office/drawing/2014/main" xmlns="" id="{717A641C-0955-D46D-9F60-A7BC9BD4544D}"/>
               </a:ext>
             </a:extLst>
           </p:cNvPr>
@@ -6512,7 +6518,7 @@
           <p:cNvPr id="4098" name="Picture 2" descr="How to use HAVING clause in SQL">
             <a:extLst>
               <a:ext uri="{FF2B5EF4-FFF2-40B4-BE49-F238E27FC236}">
-                <a16:creationId xmlns:a16="http://schemas.microsoft.com/office/drawing/2014/main" id="{AD20854A-8222-2615-6718-5A517F767E8E}"/>
+                <a16:creationId xmlns:a16="http://schemas.microsoft.com/office/drawing/2014/main" xmlns="" id="{AD20854A-8222-2615-6718-5A517F767E8E}"/>
               </a:ext>
             </a:extLst>
           </p:cNvPr>
@@ -6589,7 +6595,7 @@
           <p:cNvPr id="2" name="Title 1">
             <a:extLst>
               <a:ext uri="{FF2B5EF4-FFF2-40B4-BE49-F238E27FC236}">
-                <a16:creationId xmlns:a16="http://schemas.microsoft.com/office/drawing/2014/main" id="{03C71A4D-6B4C-DA8C-DF20-B29DE3114824}"/>
+                <a16:creationId xmlns:a16="http://schemas.microsoft.com/office/drawing/2014/main" xmlns="" id="{03C71A4D-6B4C-DA8C-DF20-B29DE3114824}"/>
               </a:ext>
             </a:extLst>
           </p:cNvPr>
@@ -6617,7 +6623,7 @@
           <p:cNvPr id="3" name="Content Placeholder 2">
             <a:extLst>
               <a:ext uri="{FF2B5EF4-FFF2-40B4-BE49-F238E27FC236}">
-                <a16:creationId xmlns:a16="http://schemas.microsoft.com/office/drawing/2014/main" id="{5B97B098-C830-0756-D9CF-8D1121166264}"/>
+                <a16:creationId xmlns:a16="http://schemas.microsoft.com/office/drawing/2014/main" xmlns="" id="{5B97B098-C830-0756-D9CF-8D1121166264}"/>
               </a:ext>
             </a:extLst>
           </p:cNvPr>
@@ -6828,7 +6834,7 @@
           <p:cNvPr id="2" name="Title 1">
             <a:extLst>
               <a:ext uri="{FF2B5EF4-FFF2-40B4-BE49-F238E27FC236}">
-                <a16:creationId xmlns:a16="http://schemas.microsoft.com/office/drawing/2014/main" id="{2C5E16B1-75D2-1B33-CF87-8BA58D695AFE}"/>
+                <a16:creationId xmlns:a16="http://schemas.microsoft.com/office/drawing/2014/main" xmlns="" id="{2C5E16B1-75D2-1B33-CF87-8BA58D695AFE}"/>
               </a:ext>
             </a:extLst>
           </p:cNvPr>
@@ -6856,7 +6862,7 @@
           <p:cNvPr id="3" name="Content Placeholder 2">
             <a:extLst>
               <a:ext uri="{FF2B5EF4-FFF2-40B4-BE49-F238E27FC236}">
-                <a16:creationId xmlns:a16="http://schemas.microsoft.com/office/drawing/2014/main" id="{33D1B2AF-CB5D-CD1E-EDEA-CBE492FED8FB}"/>
+                <a16:creationId xmlns:a16="http://schemas.microsoft.com/office/drawing/2014/main" xmlns="" id="{33D1B2AF-CB5D-CD1E-EDEA-CBE492FED8FB}"/>
               </a:ext>
             </a:extLst>
           </p:cNvPr>
@@ -6969,7 +6975,7 @@
           <p:cNvPr id="2" name="Title 1">
             <a:extLst>
               <a:ext uri="{FF2B5EF4-FFF2-40B4-BE49-F238E27FC236}">
-                <a16:creationId xmlns:a16="http://schemas.microsoft.com/office/drawing/2014/main" id="{5C66AA73-F455-9B79-BBD2-1CC01FCC2E43}"/>
+                <a16:creationId xmlns:a16="http://schemas.microsoft.com/office/drawing/2014/main" xmlns="" id="{5C66AA73-F455-9B79-BBD2-1CC01FCC2E43}"/>
               </a:ext>
             </a:extLst>
           </p:cNvPr>
@@ -6997,7 +7003,7 @@
           <p:cNvPr id="3" name="Content Placeholder 2">
             <a:extLst>
               <a:ext uri="{FF2B5EF4-FFF2-40B4-BE49-F238E27FC236}">
-                <a16:creationId xmlns:a16="http://schemas.microsoft.com/office/drawing/2014/main" id="{8DF2AAC6-FEC4-8FDA-7478-B808D995B807}"/>
+                <a16:creationId xmlns:a16="http://schemas.microsoft.com/office/drawing/2014/main" xmlns="" id="{8DF2AAC6-FEC4-8FDA-7478-B808D995B807}"/>
               </a:ext>
             </a:extLst>
           </p:cNvPr>
@@ -7133,7 +7139,7 @@
           <p:cNvPr id="2" name="Title 1">
             <a:extLst>
               <a:ext uri="{FF2B5EF4-FFF2-40B4-BE49-F238E27FC236}">
-                <a16:creationId xmlns:a16="http://schemas.microsoft.com/office/drawing/2014/main" id="{F6860BDD-1945-BDFD-C47C-F1AA7C557745}"/>
+                <a16:creationId xmlns:a16="http://schemas.microsoft.com/office/drawing/2014/main" xmlns="" id="{F6860BDD-1945-BDFD-C47C-F1AA7C557745}"/>
               </a:ext>
             </a:extLst>
           </p:cNvPr>
@@ -7161,7 +7167,7 @@
           <p:cNvPr id="3" name="Content Placeholder 2">
             <a:extLst>
               <a:ext uri="{FF2B5EF4-FFF2-40B4-BE49-F238E27FC236}">
-                <a16:creationId xmlns:a16="http://schemas.microsoft.com/office/drawing/2014/main" id="{DA332A51-EA2A-FAFA-DB12-8CDE30AFA35C}"/>
+                <a16:creationId xmlns:a16="http://schemas.microsoft.com/office/drawing/2014/main" xmlns="" id="{DA332A51-EA2A-FAFA-DB12-8CDE30AFA35C}"/>
               </a:ext>
             </a:extLst>
           </p:cNvPr>
@@ -7250,7 +7256,7 @@
           <p:cNvPr id="2" name="Title 1">
             <a:extLst>
               <a:ext uri="{FF2B5EF4-FFF2-40B4-BE49-F238E27FC236}">
-                <a16:creationId xmlns:a16="http://schemas.microsoft.com/office/drawing/2014/main" id="{38A4800F-6223-5D38-1593-670D0096142C}"/>
+                <a16:creationId xmlns:a16="http://schemas.microsoft.com/office/drawing/2014/main" xmlns="" id="{38A4800F-6223-5D38-1593-670D0096142C}"/>
               </a:ext>
             </a:extLst>
           </p:cNvPr>
@@ -7278,7 +7284,7 @@
           <p:cNvPr id="3" name="Content Placeholder 2">
             <a:extLst>
               <a:ext uri="{FF2B5EF4-FFF2-40B4-BE49-F238E27FC236}">
-                <a16:creationId xmlns:a16="http://schemas.microsoft.com/office/drawing/2014/main" id="{28C46F00-57EB-21A0-A8AC-602C5BB82772}"/>
+                <a16:creationId xmlns:a16="http://schemas.microsoft.com/office/drawing/2014/main" xmlns="" id="{28C46F00-57EB-21A0-A8AC-602C5BB82772}"/>
               </a:ext>
             </a:extLst>
           </p:cNvPr>
@@ -7373,7 +7379,7 @@
           <p:cNvPr id="5" name="Straight Arrow Connector 4">
             <a:extLst>
               <a:ext uri="{FF2B5EF4-FFF2-40B4-BE49-F238E27FC236}">
-                <a16:creationId xmlns:a16="http://schemas.microsoft.com/office/drawing/2014/main" id="{89BD7BBA-8925-E341-AD20-663CACC129FD}"/>
+                <a16:creationId xmlns:a16="http://schemas.microsoft.com/office/drawing/2014/main" xmlns="" id="{89BD7BBA-8925-E341-AD20-663CACC129FD}"/>
               </a:ext>
             </a:extLst>
           </p:cNvPr>
@@ -7412,7 +7418,7 @@
           <p:cNvPr id="6" name="TextBox 5">
             <a:extLst>
               <a:ext uri="{FF2B5EF4-FFF2-40B4-BE49-F238E27FC236}">
-                <a16:creationId xmlns:a16="http://schemas.microsoft.com/office/drawing/2014/main" id="{B4AD08A5-BF36-A0A2-B13B-2DE2951BBC1C}"/>
+                <a16:creationId xmlns:a16="http://schemas.microsoft.com/office/drawing/2014/main" xmlns="" id="{B4AD08A5-BF36-A0A2-B13B-2DE2951BBC1C}"/>
               </a:ext>
             </a:extLst>
           </p:cNvPr>
@@ -7447,7 +7453,7 @@
           <p:cNvPr id="8" name="Straight Arrow Connector 7">
             <a:extLst>
               <a:ext uri="{FF2B5EF4-FFF2-40B4-BE49-F238E27FC236}">
-                <a16:creationId xmlns:a16="http://schemas.microsoft.com/office/drawing/2014/main" id="{48B48510-C272-C1E6-D881-902C6E6C5CCE}"/>
+                <a16:creationId xmlns:a16="http://schemas.microsoft.com/office/drawing/2014/main" xmlns="" id="{48B48510-C272-C1E6-D881-902C6E6C5CCE}"/>
               </a:ext>
             </a:extLst>
           </p:cNvPr>
@@ -7486,7 +7492,7 @@
           <p:cNvPr id="9" name="Straight Arrow Connector 8">
             <a:extLst>
               <a:ext uri="{FF2B5EF4-FFF2-40B4-BE49-F238E27FC236}">
-                <a16:creationId xmlns:a16="http://schemas.microsoft.com/office/drawing/2014/main" id="{A8A8774C-6091-D632-7AC3-0B8E32BC8015}"/>
+                <a16:creationId xmlns:a16="http://schemas.microsoft.com/office/drawing/2014/main" xmlns="" id="{A8A8774C-6091-D632-7AC3-0B8E32BC8015}"/>
               </a:ext>
             </a:extLst>
           </p:cNvPr>
@@ -7525,7 +7531,7 @@
           <p:cNvPr id="10" name="TextBox 9">
             <a:extLst>
               <a:ext uri="{FF2B5EF4-FFF2-40B4-BE49-F238E27FC236}">
-                <a16:creationId xmlns:a16="http://schemas.microsoft.com/office/drawing/2014/main" id="{9956A1C7-B832-3316-550E-604620457FC7}"/>
+                <a16:creationId xmlns:a16="http://schemas.microsoft.com/office/drawing/2014/main" xmlns="" id="{9956A1C7-B832-3316-550E-604620457FC7}"/>
               </a:ext>
             </a:extLst>
           </p:cNvPr>
@@ -7590,7 +7596,7 @@
           <p:cNvPr id="2" name="Title 1">
             <a:extLst>
               <a:ext uri="{FF2B5EF4-FFF2-40B4-BE49-F238E27FC236}">
-                <a16:creationId xmlns:a16="http://schemas.microsoft.com/office/drawing/2014/main" id="{9CFB8A95-9ABE-48A3-C431-EF737F9278A9}"/>
+                <a16:creationId xmlns:a16="http://schemas.microsoft.com/office/drawing/2014/main" xmlns="" id="{9CFB8A95-9ABE-48A3-C431-EF737F9278A9}"/>
               </a:ext>
             </a:extLst>
           </p:cNvPr>
@@ -7618,7 +7624,7 @@
           <p:cNvPr id="3" name="Content Placeholder 2">
             <a:extLst>
               <a:ext uri="{FF2B5EF4-FFF2-40B4-BE49-F238E27FC236}">
-                <a16:creationId xmlns:a16="http://schemas.microsoft.com/office/drawing/2014/main" id="{F357AF08-F7FC-92FE-DF60-05753D8F4A8D}"/>
+                <a16:creationId xmlns:a16="http://schemas.microsoft.com/office/drawing/2014/main" xmlns="" id="{F357AF08-F7FC-92FE-DF60-05753D8F4A8D}"/>
               </a:ext>
             </a:extLst>
           </p:cNvPr>
@@ -7720,7 +7726,7 @@
           <p:cNvPr id="2" name="Title 1">
             <a:extLst>
               <a:ext uri="{FF2B5EF4-FFF2-40B4-BE49-F238E27FC236}">
-                <a16:creationId xmlns:a16="http://schemas.microsoft.com/office/drawing/2014/main" id="{2A57D3CD-F326-9807-4657-8CEBDA37DDDA}"/>
+                <a16:creationId xmlns:a16="http://schemas.microsoft.com/office/drawing/2014/main" xmlns="" id="{2A57D3CD-F326-9807-4657-8CEBDA37DDDA}"/>
               </a:ext>
             </a:extLst>
           </p:cNvPr>
@@ -7748,7 +7754,7 @@
           <p:cNvPr id="3" name="Content Placeholder 2">
             <a:extLst>
               <a:ext uri="{FF2B5EF4-FFF2-40B4-BE49-F238E27FC236}">
-                <a16:creationId xmlns:a16="http://schemas.microsoft.com/office/drawing/2014/main" id="{D9CCB422-FE52-A724-B237-DDBF4FBC4A41}"/>
+                <a16:creationId xmlns:a16="http://schemas.microsoft.com/office/drawing/2014/main" xmlns="" id="{D9CCB422-FE52-A724-B237-DDBF4FBC4A41}"/>
               </a:ext>
             </a:extLst>
           </p:cNvPr>

</xml_diff>